<commit_message>
maquette du site web faite
</commit_message>
<xml_diff>
--- a/Brainstorming.pptx
+++ b/Brainstorming.pptx
@@ -107,6 +107,11 @@
       </a:defRPr>
     </a:lvl9pPr>
   </p:defaultTextStyle>
+  <p:extLst>
+    <p:ext uri="{EFAFB233-063F-42B5-8137-9DF3F51BA10A}">
+      <p15:sldGuideLst xmlns:p15="http://schemas.microsoft.com/office/powerpoint/2012/main"/>
+    </p:ext>
+  </p:extLst>
 </p:presentation>
 </file>
 
@@ -241,7 +246,7 @@
           <a:p>
             <a:fld id="{821570D6-2154-4FCF-8534-509B5804CD21}" type="datetimeFigureOut">
               <a:rPr lang="en-US" smtClean="0"/>
-              <a:t>2/28/2019</a:t>
+              <a:t>3/15/2019</a:t>
             </a:fld>
             <a:endParaRPr lang="en-US"/>
           </a:p>
@@ -411,7 +416,7 @@
           <a:p>
             <a:fld id="{821570D6-2154-4FCF-8534-509B5804CD21}" type="datetimeFigureOut">
               <a:rPr lang="en-US" smtClean="0"/>
-              <a:t>2/28/2019</a:t>
+              <a:t>3/15/2019</a:t>
             </a:fld>
             <a:endParaRPr lang="en-US"/>
           </a:p>
@@ -591,7 +596,7 @@
           <a:p>
             <a:fld id="{821570D6-2154-4FCF-8534-509B5804CD21}" type="datetimeFigureOut">
               <a:rPr lang="en-US" smtClean="0"/>
-              <a:t>2/28/2019</a:t>
+              <a:t>3/15/2019</a:t>
             </a:fld>
             <a:endParaRPr lang="en-US"/>
           </a:p>
@@ -761,7 +766,7 @@
           <a:p>
             <a:fld id="{821570D6-2154-4FCF-8534-509B5804CD21}" type="datetimeFigureOut">
               <a:rPr lang="en-US" smtClean="0"/>
-              <a:t>2/28/2019</a:t>
+              <a:t>3/15/2019</a:t>
             </a:fld>
             <a:endParaRPr lang="en-US"/>
           </a:p>
@@ -1007,7 +1012,7 @@
           <a:p>
             <a:fld id="{821570D6-2154-4FCF-8534-509B5804CD21}" type="datetimeFigureOut">
               <a:rPr lang="en-US" smtClean="0"/>
-              <a:t>2/28/2019</a:t>
+              <a:t>3/15/2019</a:t>
             </a:fld>
             <a:endParaRPr lang="en-US"/>
           </a:p>
@@ -1239,7 +1244,7 @@
           <a:p>
             <a:fld id="{821570D6-2154-4FCF-8534-509B5804CD21}" type="datetimeFigureOut">
               <a:rPr lang="en-US" smtClean="0"/>
-              <a:t>2/28/2019</a:t>
+              <a:t>3/15/2019</a:t>
             </a:fld>
             <a:endParaRPr lang="en-US"/>
           </a:p>
@@ -1606,7 +1611,7 @@
           <a:p>
             <a:fld id="{821570D6-2154-4FCF-8534-509B5804CD21}" type="datetimeFigureOut">
               <a:rPr lang="en-US" smtClean="0"/>
-              <a:t>2/28/2019</a:t>
+              <a:t>3/15/2019</a:t>
             </a:fld>
             <a:endParaRPr lang="en-US"/>
           </a:p>
@@ -1724,7 +1729,7 @@
           <a:p>
             <a:fld id="{821570D6-2154-4FCF-8534-509B5804CD21}" type="datetimeFigureOut">
               <a:rPr lang="en-US" smtClean="0"/>
-              <a:t>2/28/2019</a:t>
+              <a:t>3/15/2019</a:t>
             </a:fld>
             <a:endParaRPr lang="en-US"/>
           </a:p>
@@ -1819,7 +1824,7 @@
           <a:p>
             <a:fld id="{821570D6-2154-4FCF-8534-509B5804CD21}" type="datetimeFigureOut">
               <a:rPr lang="en-US" smtClean="0"/>
-              <a:t>2/28/2019</a:t>
+              <a:t>3/15/2019</a:t>
             </a:fld>
             <a:endParaRPr lang="en-US"/>
           </a:p>
@@ -2096,7 +2101,7 @@
           <a:p>
             <a:fld id="{821570D6-2154-4FCF-8534-509B5804CD21}" type="datetimeFigureOut">
               <a:rPr lang="en-US" smtClean="0"/>
-              <a:t>2/28/2019</a:t>
+              <a:t>3/15/2019</a:t>
             </a:fld>
             <a:endParaRPr lang="en-US"/>
           </a:p>
@@ -2349,7 +2354,7 @@
           <a:p>
             <a:fld id="{821570D6-2154-4FCF-8534-509B5804CD21}" type="datetimeFigureOut">
               <a:rPr lang="en-US" smtClean="0"/>
-              <a:t>2/28/2019</a:t>
+              <a:t>3/15/2019</a:t>
             </a:fld>
             <a:endParaRPr lang="en-US"/>
           </a:p>
@@ -2562,7 +2567,7 @@
           <a:p>
             <a:fld id="{821570D6-2154-4FCF-8534-509B5804CD21}" type="datetimeFigureOut">
               <a:rPr lang="en-US" smtClean="0"/>
-              <a:t>2/28/2019</a:t>
+              <a:t>3/15/2019</a:t>
             </a:fld>
             <a:endParaRPr lang="en-US"/>
           </a:p>
@@ -2976,7 +2981,7 @@
         <p:spPr>
           <a:xfrm>
             <a:off x="294468" y="356461"/>
-            <a:ext cx="11685722" cy="4001095"/>
+            <a:ext cx="11685722" cy="4278094"/>
           </a:xfrm>
           <a:prstGeom prst="rect">
             <a:avLst/>
@@ -3023,8 +3028,48 @@
             </a:pPr>
             <a:r>
               <a:rPr lang="fr-FR" dirty="0" smtClean="0"/>
-              <a:t>Une liste de restaurants (10) correspondant à la zone affichée, format JSON, directement en mémoire</a:t>
-            </a:r>
+              <a:t>Une liste de restaurants (10) correspondant à la zone affichée, format JSON, directement en </a:t>
+            </a:r>
+            <a:r>
+              <a:rPr lang="fr-FR" dirty="0" smtClean="0"/>
+              <a:t>mémoire</a:t>
+            </a:r>
+            <a:br>
+              <a:rPr lang="fr-FR" dirty="0" smtClean="0"/>
+            </a:br>
+            <a:r>
+              <a:rPr lang="fr-FR" dirty="0" err="1" smtClean="0"/>
+              <a:t>Div</a:t>
+            </a:r>
+            <a:r>
+              <a:rPr lang="fr-FR" dirty="0" smtClean="0"/>
+              <a:t> avec une </a:t>
+            </a:r>
+            <a:r>
+              <a:rPr lang="fr-FR" dirty="0" err="1" smtClean="0"/>
+              <a:t>fixed</a:t>
+            </a:r>
+            <a:r>
+              <a:rPr lang="fr-FR" dirty="0" smtClean="0"/>
+              <a:t> </a:t>
+            </a:r>
+            <a:r>
+              <a:rPr lang="fr-FR" dirty="0" err="1" smtClean="0"/>
+              <a:t>heigh</a:t>
+            </a:r>
+            <a:r>
+              <a:rPr lang="fr-FR" dirty="0" err="1" smtClean="0"/>
+              <a:t>t</a:t>
+            </a:r>
+            <a:r>
+              <a:rPr lang="fr-FR" dirty="0" smtClean="0"/>
+              <a:t>, et à l’intérieur une div où on scroll. Evite d’étendre la hauteur de la </a:t>
+            </a:r>
+            <a:r>
+              <a:rPr lang="fr-FR" smtClean="0"/>
+              <a:t>page web</a:t>
+            </a:r>
+            <a:endParaRPr lang="fr-FR" dirty="0" smtClean="0"/>
           </a:p>
           <a:p>
             <a:pPr marL="285750" indent="-285750">
@@ -3040,8 +3085,13 @@
             </a:pPr>
             <a:r>
               <a:rPr lang="fr-FR" dirty="0" smtClean="0"/>
-              <a:t>Les 2 éléments sont côte à côte : carte et liste de restaurants (ceux visibles sur la carte, marqueur)</a:t>
-            </a:r>
+              <a:t>Les 2 éléments sont côte à côte : carte et liste de restaurants (ceux visibles sur la </a:t>
+            </a:r>
+            <a:r>
+              <a:rPr lang="fr-FR" dirty="0" smtClean="0"/>
+              <a:t>carte)</a:t>
+            </a:r>
+            <a:endParaRPr lang="fr-FR" dirty="0" smtClean="0"/>
           </a:p>
           <a:p>
             <a:pPr marL="285750" indent="-285750">
@@ -3067,7 +3117,15 @@
             </a:pPr>
             <a:r>
               <a:rPr lang="fr-FR" dirty="0" smtClean="0"/>
-              <a:t>Quand clique sur un restaurant (marqueur carte ou titre dans liste), affichage liste des avis + commentaires + photo Google Street </a:t>
+              <a:t>Quand clique sur un restaurant (marqueur carte ou titre dans liste), affichage liste </a:t>
+            </a:r>
+            <a:r>
+              <a:rPr lang="fr-FR" dirty="0" smtClean="0"/>
+              <a:t>des </a:t>
+            </a:r>
+            <a:r>
+              <a:rPr lang="fr-FR" dirty="0" smtClean="0"/>
+              <a:t>commentaires + photo Google Street </a:t>
             </a:r>
             <a:r>
               <a:rPr lang="fr-FR" dirty="0" err="1" smtClean="0"/>
@@ -3157,7 +3215,7 @@
         <p:spPr>
           <a:xfrm>
             <a:off x="294468" y="356461"/>
-            <a:ext cx="11685722" cy="3170099"/>
+            <a:ext cx="11685722" cy="3447098"/>
           </a:xfrm>
           <a:prstGeom prst="rect">
             <a:avLst/>
@@ -3186,7 +3244,15 @@
             </a:pPr>
             <a:r>
               <a:rPr lang="fr-FR" dirty="0" smtClean="0"/>
-              <a:t>Possibilité d’ajouter un avis sur le restaurant, au-dessus des avis sous la carte, un titre + nom utilisateur + </a:t>
+              <a:t>Possibilité d’ajouter un avis sur le </a:t>
+            </a:r>
+            <a:r>
+              <a:rPr lang="fr-FR" dirty="0" smtClean="0"/>
+              <a:t>restaurant sous </a:t>
+            </a:r>
+            <a:r>
+              <a:rPr lang="fr-FR" dirty="0" smtClean="0"/>
+              <a:t>la carte, un titre + nom utilisateur + </a:t>
             </a:r>
             <a:r>
               <a:rPr lang="fr-FR" dirty="0" err="1" smtClean="0"/>
@@ -3194,7 +3260,15 @@
             </a:r>
             <a:r>
               <a:rPr lang="fr-FR" dirty="0" smtClean="0"/>
-              <a:t> pour ajouter le sien, avec bouton envoyer.</a:t>
+              <a:t> pour ajouter le sien, avec bouton envoyer</a:t>
+            </a:r>
+            <a:r>
+              <a:rPr lang="fr-FR" dirty="0" smtClean="0"/>
+              <a:t>. </a:t>
+            </a:r>
+            <a:r>
+              <a:rPr lang="fr-FR" dirty="0" smtClean="0"/>
+              <a:t>Bouton ajouter un avis à côté à côté du nom, à côté de la note en étoiles</a:t>
             </a:r>
           </a:p>
           <a:p>
@@ -3211,8 +3285,25 @@
             </a:pPr>
             <a:r>
               <a:rPr lang="fr-FR" dirty="0" smtClean="0"/>
-              <a:t>Possibilité d’ajouter un restaurant en cliquant sur un lieu de la carte (nouveau marqueur), demande d’informations sur le restaurant à travers un formulaire</a:t>
-            </a:r>
+              <a:t>Possibilité d’ajouter un restaurant en cliquant sur un lieu de la carte (nouveau marqueur), demande d’informations sur le restaurant à travers un </a:t>
+            </a:r>
+            <a:r>
+              <a:rPr lang="fr-FR" dirty="0" smtClean="0"/>
+              <a:t>formulaire qui s’affiche sous la carte, même fonctionnement que pour un avis : nom restaurant, adresse, ajouté par : , photo Google Street </a:t>
+            </a:r>
+            <a:r>
+              <a:rPr lang="fr-FR" dirty="0" err="1" smtClean="0"/>
+              <a:t>View</a:t>
+            </a:r>
+            <a:r>
+              <a:rPr lang="fr-FR" dirty="0" smtClean="0"/>
+              <a:t>, bouto</a:t>
+            </a:r>
+            <a:r>
+              <a:rPr lang="fr-FR" dirty="0" smtClean="0"/>
+              <a:t>n ajouter un commentaire, se déroule sous le formulaire.</a:t>
+            </a:r>
+            <a:endParaRPr lang="fr-FR" dirty="0" smtClean="0"/>
           </a:p>
           <a:p>
             <a:pPr marL="285750" indent="-285750">

</xml_diff>

<commit_message>
versions responsive du design faites
</commit_message>
<xml_diff>
--- a/Brainstorming.pptx
+++ b/Brainstorming.pptx
@@ -246,7 +246,7 @@
           <a:p>
             <a:fld id="{821570D6-2154-4FCF-8534-509B5804CD21}" type="datetimeFigureOut">
               <a:rPr lang="en-US" smtClean="0"/>
-              <a:t>3/15/2019</a:t>
+              <a:t>3/18/2019</a:t>
             </a:fld>
             <a:endParaRPr lang="en-US"/>
           </a:p>
@@ -416,7 +416,7 @@
           <a:p>
             <a:fld id="{821570D6-2154-4FCF-8534-509B5804CD21}" type="datetimeFigureOut">
               <a:rPr lang="en-US" smtClean="0"/>
-              <a:t>3/15/2019</a:t>
+              <a:t>3/18/2019</a:t>
             </a:fld>
             <a:endParaRPr lang="en-US"/>
           </a:p>
@@ -596,7 +596,7 @@
           <a:p>
             <a:fld id="{821570D6-2154-4FCF-8534-509B5804CD21}" type="datetimeFigureOut">
               <a:rPr lang="en-US" smtClean="0"/>
-              <a:t>3/15/2019</a:t>
+              <a:t>3/18/2019</a:t>
             </a:fld>
             <a:endParaRPr lang="en-US"/>
           </a:p>
@@ -766,7 +766,7 @@
           <a:p>
             <a:fld id="{821570D6-2154-4FCF-8534-509B5804CD21}" type="datetimeFigureOut">
               <a:rPr lang="en-US" smtClean="0"/>
-              <a:t>3/15/2019</a:t>
+              <a:t>3/18/2019</a:t>
             </a:fld>
             <a:endParaRPr lang="en-US"/>
           </a:p>
@@ -1012,7 +1012,7 @@
           <a:p>
             <a:fld id="{821570D6-2154-4FCF-8534-509B5804CD21}" type="datetimeFigureOut">
               <a:rPr lang="en-US" smtClean="0"/>
-              <a:t>3/15/2019</a:t>
+              <a:t>3/18/2019</a:t>
             </a:fld>
             <a:endParaRPr lang="en-US"/>
           </a:p>
@@ -1244,7 +1244,7 @@
           <a:p>
             <a:fld id="{821570D6-2154-4FCF-8534-509B5804CD21}" type="datetimeFigureOut">
               <a:rPr lang="en-US" smtClean="0"/>
-              <a:t>3/15/2019</a:t>
+              <a:t>3/18/2019</a:t>
             </a:fld>
             <a:endParaRPr lang="en-US"/>
           </a:p>
@@ -1611,7 +1611,7 @@
           <a:p>
             <a:fld id="{821570D6-2154-4FCF-8534-509B5804CD21}" type="datetimeFigureOut">
               <a:rPr lang="en-US" smtClean="0"/>
-              <a:t>3/15/2019</a:t>
+              <a:t>3/18/2019</a:t>
             </a:fld>
             <a:endParaRPr lang="en-US"/>
           </a:p>
@@ -1729,7 +1729,7 @@
           <a:p>
             <a:fld id="{821570D6-2154-4FCF-8534-509B5804CD21}" type="datetimeFigureOut">
               <a:rPr lang="en-US" smtClean="0"/>
-              <a:t>3/15/2019</a:t>
+              <a:t>3/18/2019</a:t>
             </a:fld>
             <a:endParaRPr lang="en-US"/>
           </a:p>
@@ -1824,7 +1824,7 @@
           <a:p>
             <a:fld id="{821570D6-2154-4FCF-8534-509B5804CD21}" type="datetimeFigureOut">
               <a:rPr lang="en-US" smtClean="0"/>
-              <a:t>3/15/2019</a:t>
+              <a:t>3/18/2019</a:t>
             </a:fld>
             <a:endParaRPr lang="en-US"/>
           </a:p>
@@ -2101,7 +2101,7 @@
           <a:p>
             <a:fld id="{821570D6-2154-4FCF-8534-509B5804CD21}" type="datetimeFigureOut">
               <a:rPr lang="en-US" smtClean="0"/>
-              <a:t>3/15/2019</a:t>
+              <a:t>3/18/2019</a:t>
             </a:fld>
             <a:endParaRPr lang="en-US"/>
           </a:p>
@@ -2354,7 +2354,7 @@
           <a:p>
             <a:fld id="{821570D6-2154-4FCF-8534-509B5804CD21}" type="datetimeFigureOut">
               <a:rPr lang="en-US" smtClean="0"/>
-              <a:t>3/15/2019</a:t>
+              <a:t>3/18/2019</a:t>
             </a:fld>
             <a:endParaRPr lang="en-US"/>
           </a:p>
@@ -2567,7 +2567,7 @@
           <a:p>
             <a:fld id="{821570D6-2154-4FCF-8534-509B5804CD21}" type="datetimeFigureOut">
               <a:rPr lang="en-US" smtClean="0"/>
-              <a:t>3/15/2019</a:t>
+              <a:t>3/18/2019</a:t>
             </a:fld>
             <a:endParaRPr lang="en-US"/>
           </a:p>
@@ -2981,7 +2981,7 @@
         <p:spPr>
           <a:xfrm>
             <a:off x="294468" y="356461"/>
-            <a:ext cx="11685722" cy="4278094"/>
+            <a:ext cx="11685722" cy="4832092"/>
           </a:xfrm>
           <a:prstGeom prst="rect">
             <a:avLst/>
@@ -3028,11 +3028,7 @@
             </a:pPr>
             <a:r>
               <a:rPr lang="fr-FR" dirty="0" smtClean="0"/>
-              <a:t>Une liste de restaurants (10) correspondant à la zone affichée, format JSON, directement en </a:t>
-            </a:r>
-            <a:r>
-              <a:rPr lang="fr-FR" dirty="0" smtClean="0"/>
-              <a:t>mémoire</a:t>
+              <a:t>Une liste de restaurants (10) correspondant à la zone affichée, format JSON, directement en mémoire</a:t>
             </a:r>
             <a:br>
               <a:rPr lang="fr-FR" dirty="0" smtClean="0"/>
@@ -3055,21 +3051,12 @@
             </a:r>
             <a:r>
               <a:rPr lang="fr-FR" dirty="0" err="1" smtClean="0"/>
-              <a:t>heigh</a:t>
-            </a:r>
-            <a:r>
-              <a:rPr lang="fr-FR" dirty="0" err="1" smtClean="0"/>
-              <a:t>t</a:t>
+              <a:t>height</a:t>
             </a:r>
             <a:r>
               <a:rPr lang="fr-FR" dirty="0" smtClean="0"/>
-              <a:t>, et à l’intérieur une div où on scroll. Evite d’étendre la hauteur de la </a:t>
-            </a:r>
-            <a:r>
-              <a:rPr lang="fr-FR" smtClean="0"/>
-              <a:t>page web</a:t>
-            </a:r>
-            <a:endParaRPr lang="fr-FR" dirty="0" smtClean="0"/>
+              <a:t>, et à l’intérieur une div où on scroll. Evite d’étendre la hauteur de la page web</a:t>
+            </a:r>
           </a:p>
           <a:p>
             <a:pPr marL="285750" indent="-285750">
@@ -3085,13 +3072,8 @@
             </a:pPr>
             <a:r>
               <a:rPr lang="fr-FR" dirty="0" smtClean="0"/>
-              <a:t>Les 2 éléments sont côte à côte : carte et liste de restaurants (ceux visibles sur la </a:t>
-            </a:r>
-            <a:r>
-              <a:rPr lang="fr-FR" dirty="0" smtClean="0"/>
-              <a:t>carte)</a:t>
-            </a:r>
-            <a:endParaRPr lang="fr-FR" dirty="0" smtClean="0"/>
+              <a:t>Les 2 éléments sont côte à côte : carte et liste de restaurants (ceux visibles sur la carte)</a:t>
+            </a:r>
           </a:p>
           <a:p>
             <a:pPr marL="285750" indent="-285750">
@@ -3100,7 +3082,11 @@
             </a:pPr>
             <a:r>
               <a:rPr lang="fr-FR" dirty="0" smtClean="0"/>
-              <a:t>Afficher score moyen pour les restaurants (à côté de leur nom)</a:t>
+              <a:t>Afficher score moyen pour les restaurants (à côté de leur nom</a:t>
+            </a:r>
+            <a:r>
+              <a:rPr lang="fr-FR" dirty="0" smtClean="0"/>
+              <a:t>)</a:t>
             </a:r>
           </a:p>
           <a:p>
@@ -3117,15 +3103,29 @@
             </a:pPr>
             <a:r>
               <a:rPr lang="fr-FR" dirty="0" smtClean="0"/>
-              <a:t>Quand clique sur un restaurant (marqueur carte ou titre dans liste), affichage liste </a:t>
-            </a:r>
+              <a:t>Sur la carte, nom du restaurant (pour </a:t>
+            </a:r>
+            <a:r>
+              <a:rPr lang="fr-FR" smtClean="0"/>
+              <a:t>le retrouver dans la liste)</a:t>
+            </a:r>
+            <a:endParaRPr lang="fr-FR" dirty="0" smtClean="0"/>
+          </a:p>
+          <a:p>
+            <a:pPr marL="285750" indent="-285750">
+              <a:buFontTx/>
+              <a:buChar char="-"/>
+            </a:pPr>
+            <a:endParaRPr lang="fr-FR" dirty="0"/>
+          </a:p>
+          <a:p>
+            <a:pPr marL="285750" indent="-285750">
+              <a:buFontTx/>
+              <a:buChar char="-"/>
+            </a:pPr>
             <a:r>
               <a:rPr lang="fr-FR" dirty="0" smtClean="0"/>
-              <a:t>des </a:t>
-            </a:r>
-            <a:r>
-              <a:rPr lang="fr-FR" dirty="0" smtClean="0"/>
-              <a:t>commentaires + photo Google Street </a:t>
+              <a:t>Quand clique sur un restaurant (marqueur carte ou titre dans liste), affichage liste des commentaires + photo Google Street </a:t>
             </a:r>
             <a:r>
               <a:rPr lang="fr-FR" dirty="0" err="1" smtClean="0"/>
@@ -3244,15 +3244,7 @@
             </a:pPr>
             <a:r>
               <a:rPr lang="fr-FR" dirty="0" smtClean="0"/>
-              <a:t>Possibilité d’ajouter un avis sur le </a:t>
-            </a:r>
-            <a:r>
-              <a:rPr lang="fr-FR" dirty="0" smtClean="0"/>
-              <a:t>restaurant sous </a:t>
-            </a:r>
-            <a:r>
-              <a:rPr lang="fr-FR" dirty="0" smtClean="0"/>
-              <a:t>la carte, un titre + nom utilisateur + </a:t>
+              <a:t>Possibilité d’ajouter un avis sur le restaurant sous la carte, un titre + nom utilisateur + </a:t>
             </a:r>
             <a:r>
               <a:rPr lang="fr-FR" dirty="0" err="1" smtClean="0"/>
@@ -3260,15 +3252,7 @@
             </a:r>
             <a:r>
               <a:rPr lang="fr-FR" dirty="0" smtClean="0"/>
-              <a:t> pour ajouter le sien, avec bouton envoyer</a:t>
-            </a:r>
-            <a:r>
-              <a:rPr lang="fr-FR" dirty="0" smtClean="0"/>
-              <a:t>. </a:t>
-            </a:r>
-            <a:r>
-              <a:rPr lang="fr-FR" dirty="0" smtClean="0"/>
-              <a:t>Bouton ajouter un avis à côté à côté du nom, à côté de la note en étoiles</a:t>
+              <a:t> pour ajouter le sien, avec bouton envoyer. Bouton ajouter un avis à côté à côté du nom, à côté de la note en étoiles</a:t>
             </a:r>
           </a:p>
           <a:p>
@@ -3285,11 +3269,7 @@
             </a:pPr>
             <a:r>
               <a:rPr lang="fr-FR" dirty="0" smtClean="0"/>
-              <a:t>Possibilité d’ajouter un restaurant en cliquant sur un lieu de la carte (nouveau marqueur), demande d’informations sur le restaurant à travers un </a:t>
-            </a:r>
-            <a:r>
-              <a:rPr lang="fr-FR" dirty="0" smtClean="0"/>
-              <a:t>formulaire qui s’affiche sous la carte, même fonctionnement que pour un avis : nom restaurant, adresse, ajouté par : , photo Google Street </a:t>
+              <a:t>Possibilité d’ajouter un restaurant en cliquant sur un lieu de la carte (nouveau marqueur), demande d’informations sur le restaurant à travers un formulaire qui s’affiche sous la carte, même fonctionnement que pour un avis : nom restaurant, adresse, ajouté par : , photo Google Street </a:t>
             </a:r>
             <a:r>
               <a:rPr lang="fr-FR" dirty="0" err="1" smtClean="0"/>
@@ -3297,13 +3277,8 @@
             </a:r>
             <a:r>
               <a:rPr lang="fr-FR" dirty="0" smtClean="0"/>
-              <a:t>, bouto</a:t>
-            </a:r>
-            <a:r>
-              <a:rPr lang="fr-FR" dirty="0" smtClean="0"/>
-              <a:t>n ajouter un commentaire, se déroule sous le formulaire.</a:t>
-            </a:r>
-            <a:endParaRPr lang="fr-FR" dirty="0" smtClean="0"/>
+              <a:t>, bouton ajouter un commentaire, se déroule sous le formulaire.</a:t>
+            </a:r>
           </a:p>
           <a:p>
             <a:pPr marL="285750" indent="-285750">

</xml_diff>